<commit_message>
Add currentTestedCardFolderSize and update sequence diagram
</commit_message>
<xml_diff>
--- a/docs/diagrams/NextCommandSequenceDiagram.pptx
+++ b/docs/diagrams/NextCommandSequenceDiagram.pptx
@@ -6185,7 +6185,7 @@
                   <a:schemeClr val="tx1"/>
                 </a:solidFill>
               </a:rPr>
-              <a:t>currentTestedCardfolder.size</a:t>
+              <a:t>currentTestedCardFolderSize</a:t>
             </a:r>
             <a:r>
               <a:rPr lang="en-US" sz="1200" dirty="0">
@@ -6193,7 +6193,7 @@
                   <a:schemeClr val="tx1"/>
                 </a:solidFill>
               </a:rPr>
-              <a:t>()]</a:t>
+              <a:t>]</a:t>
             </a:r>
             <a:endParaRPr lang="en-SG" sz="1200" dirty="0">
               <a:solidFill>

</xml_diff>